<commit_message>
GitOps-Aufgabe : Link zum Repository hinzu
</commit_message>
<xml_diff>
--- a/slides/Tag-3_4-GitOps.pptx
+++ b/slides/Tag-3_4-GitOps.pptx
@@ -7673,7 +7673,7 @@
               <a:pPr algn="ctr">
                 <a:defRPr/>
               </a:pPr>
-              <a:t>23.08.2024</a:t>
+              <a:t>26.08.2024</a:t>
             </a:fld>
             <a:endParaRPr lang="de-DE" sz="1000">
               <a:solidFill>
@@ -16689,7 +16689,23 @@
             </a:pPr>
             <a:r>
               <a:rPr lang="de-DE" dirty="0"/>
-              <a:t>Klonen Sie das Repository  &lt;…&gt;</a:t>
+              <a:t>Klonen Sie das Repository</a:t>
+            </a:r>
+          </a:p>
+          <a:p>
+            <a:pPr lvl="1">
+              <a:buFont typeface="Arial" panose="020B0604020202020204" pitchFamily="34" charset="0"/>
+              <a:buChar char="•"/>
+            </a:pPr>
+            <a:r>
+              <a:rPr lang="de-DE" dirty="0">
+                <a:hlinkClick r:id="rId3"/>
+              </a:rPr>
+              <a:t>https://github.com/anderscore-gmbh/gitlab-gitops-uebung </a:t>
+            </a:r>
+            <a:r>
+              <a:rPr lang="de-DE" dirty="0"/>
+              <a:t> </a:t>
             </a:r>
           </a:p>
           <a:p>
@@ -16703,9 +16719,8 @@
             </a:r>
           </a:p>
           <a:p>
-            <a:pPr>
-              <a:buFont typeface="Arial" panose="020B0604020202020204" pitchFamily="34" charset="0"/>
-              <a:buChar char="•"/>
+            <a:pPr marL="0" indent="0">
+              <a:buNone/>
             </a:pPr>
             <a:endParaRPr lang="de-DE" dirty="0"/>
           </a:p>

</xml_diff>